<commit_message>
feat: symbol images added
</commit_message>
<xml_diff>
--- a/images/Presentation1.pptx
+++ b/images/Presentation1.pptx
@@ -104,6 +104,11 @@
       </a:defRPr>
     </a:lvl9pPr>
   </p:defaultTextStyle>
+  <p:extLst>
+    <p:ext uri="{EFAFB233-063F-42B5-8137-9DF3F51BA10A}">
+      <p15:sldGuideLst xmlns:p15="http://schemas.microsoft.com/office/powerpoint/2012/main"/>
+    </p:ext>
+  </p:extLst>
 </p:presentation>
 </file>
 
@@ -2990,7 +2995,7 @@
         </p:nvGrpSpPr>
         <p:grpSpPr>
           <a:xfrm>
-            <a:off x="60960" y="3948008"/>
+            <a:off x="232721" y="303108"/>
             <a:ext cx="6392558" cy="5364747"/>
             <a:chOff x="60960" y="3948008"/>
             <a:chExt cx="6392558" cy="5364747"/>
@@ -3170,6 +3175,135 @@
             <a:xfrm>
               <a:off x="1763184" y="4225040"/>
               <a:ext cx="2379132" cy="1338262"/>
+            </a:xfrm>
+            <a:prstGeom prst="rect">
+              <a:avLst/>
+            </a:prstGeom>
+          </p:spPr>
+        </p:pic>
+      </p:grpSp>
+      <p:grpSp>
+        <p:nvGrpSpPr>
+          <p:cNvPr id="20" name="Group 19">
+            <a:extLst>
+              <a:ext uri="{FF2B5EF4-FFF2-40B4-BE49-F238E27FC236}">
+                <a16:creationId xmlns:a16="http://schemas.microsoft.com/office/drawing/2014/main" id="{85CC6867-2C4A-B3FF-5D36-81DD4EDAA95D}"/>
+              </a:ext>
+            </a:extLst>
+          </p:cNvPr>
+          <p:cNvGrpSpPr/>
+          <p:nvPr/>
+        </p:nvGrpSpPr>
+        <p:grpSpPr>
+          <a:xfrm>
+            <a:off x="-1866941" y="7364564"/>
+            <a:ext cx="10077441" cy="2071538"/>
+            <a:chOff x="-1866941" y="7364564"/>
+            <a:chExt cx="10077441" cy="2071538"/>
+          </a:xfrm>
+        </p:grpSpPr>
+        <p:pic>
+          <p:nvPicPr>
+            <p:cNvPr id="3" name="Picture 2">
+              <a:extLst>
+                <a:ext uri="{FF2B5EF4-FFF2-40B4-BE49-F238E27FC236}">
+                  <a16:creationId xmlns:a16="http://schemas.microsoft.com/office/drawing/2014/main" id="{D6E0D8C3-9FB5-AB4D-16D0-CC0933819678}"/>
+                </a:ext>
+              </a:extLst>
+            </p:cNvPr>
+            <p:cNvPicPr>
+              <a:picLocks noChangeAspect="1"/>
+            </p:cNvPicPr>
+            <p:nvPr/>
+          </p:nvPicPr>
+          <p:blipFill>
+            <a:blip r:embed="rId7">
+              <a:extLst>
+                <a:ext uri="{28A0092B-C50C-407E-A947-70E740481C1C}">
+                  <a14:useLocalDpi xmlns:a14="http://schemas.microsoft.com/office/drawing/2010/main" val="0"/>
+                </a:ext>
+              </a:extLst>
+            </a:blip>
+            <a:stretch>
+              <a:fillRect/>
+            </a:stretch>
+          </p:blipFill>
+          <p:spPr>
+            <a:xfrm>
+              <a:off x="-1866941" y="7364564"/>
+              <a:ext cx="3733882" cy="2071537"/>
+            </a:xfrm>
+            <a:prstGeom prst="rect">
+              <a:avLst/>
+            </a:prstGeom>
+          </p:spPr>
+        </p:pic>
+        <p:pic>
+          <p:nvPicPr>
+            <p:cNvPr id="15" name="Picture 14">
+              <a:extLst>
+                <a:ext uri="{FF2B5EF4-FFF2-40B4-BE49-F238E27FC236}">
+                  <a16:creationId xmlns:a16="http://schemas.microsoft.com/office/drawing/2014/main" id="{CE8905D4-D0B8-88A4-46DF-A62AC0B85A72}"/>
+                </a:ext>
+              </a:extLst>
+            </p:cNvPr>
+            <p:cNvPicPr>
+              <a:picLocks noChangeAspect="1"/>
+            </p:cNvPicPr>
+            <p:nvPr/>
+          </p:nvPicPr>
+          <p:blipFill>
+            <a:blip r:embed="rId8">
+              <a:extLst>
+                <a:ext uri="{28A0092B-C50C-407E-A947-70E740481C1C}">
+                  <a14:useLocalDpi xmlns:a14="http://schemas.microsoft.com/office/drawing/2010/main" val="0"/>
+                </a:ext>
+              </a:extLst>
+            </a:blip>
+            <a:stretch>
+              <a:fillRect/>
+            </a:stretch>
+          </p:blipFill>
+          <p:spPr>
+            <a:xfrm>
+              <a:off x="5370532" y="7364565"/>
+              <a:ext cx="2839968" cy="2071536"/>
+            </a:xfrm>
+            <a:prstGeom prst="rect">
+              <a:avLst/>
+            </a:prstGeom>
+          </p:spPr>
+        </p:pic>
+        <p:pic>
+          <p:nvPicPr>
+            <p:cNvPr id="19" name="Picture 18">
+              <a:extLst>
+                <a:ext uri="{FF2B5EF4-FFF2-40B4-BE49-F238E27FC236}">
+                  <a16:creationId xmlns:a16="http://schemas.microsoft.com/office/drawing/2014/main" id="{CF490632-EBA7-9E0B-C6BB-9FCBD3BAF311}"/>
+                </a:ext>
+              </a:extLst>
+            </p:cNvPr>
+            <p:cNvPicPr>
+              <a:picLocks noChangeAspect="1"/>
+            </p:cNvPicPr>
+            <p:nvPr/>
+          </p:nvPicPr>
+          <p:blipFill>
+            <a:blip r:embed="rId9">
+              <a:extLst>
+                <a:ext uri="{28A0092B-C50C-407E-A947-70E740481C1C}">
+                  <a14:useLocalDpi xmlns:a14="http://schemas.microsoft.com/office/drawing/2010/main" val="0"/>
+                </a:ext>
+              </a:extLst>
+            </a:blip>
+            <a:stretch>
+              <a:fillRect/>
+            </a:stretch>
+          </p:blipFill>
+          <p:spPr>
+            <a:xfrm rot="5400000">
+              <a:off x="2582968" y="6721298"/>
+              <a:ext cx="2071537" cy="3358071"/>
             </a:xfrm>
             <a:prstGeom prst="rect">
               <a:avLst/>

</xml_diff>